<commit_message>
added presentation + picture(bastian)
</commit_message>
<xml_diff>
--- a/ModulProjekt/Verkaufspräsentation.pptx
+++ b/ModulProjekt/Verkaufspräsentation.pptx
@@ -4,6 +4,9 @@
   <p:sldMasterIdLst>
     <p:sldMasterId id="2147483660" r:id="rId1"/>
   </p:sldMasterIdLst>
+  <p:notesMasterIdLst>
+    <p:notesMasterId r:id="rId13"/>
+  </p:notesMasterIdLst>
   <p:sldIdLst>
     <p:sldId id="256" r:id="rId2"/>
     <p:sldId id="257" r:id="rId3"/>
@@ -120,6 +123,565 @@
     </p:ext>
   </p:extLst>
 </p:presentation>
+</file>
+
+<file path=ppt/notesMasters/notesMaster1.xml><?xml version="1.0" encoding="utf-8"?>
+<p:notesMaster xmlns:a="http://schemas.openxmlformats.org/drawingml/2006/main" xmlns:r="http://schemas.openxmlformats.org/officeDocument/2006/relationships" xmlns:p="http://schemas.openxmlformats.org/presentationml/2006/main">
+  <p:cSld>
+    <p:bg>
+      <p:bgRef idx="1001">
+        <a:schemeClr val="bg1"/>
+      </p:bgRef>
+    </p:bg>
+    <p:spTree>
+      <p:nvGrpSpPr>
+        <p:cNvPr id="1" name=""/>
+        <p:cNvGrpSpPr/>
+        <p:nvPr/>
+      </p:nvGrpSpPr>
+      <p:grpSpPr>
+        <a:xfrm>
+          <a:off x="0" y="0"/>
+          <a:ext cx="0" cy="0"/>
+          <a:chOff x="0" y="0"/>
+          <a:chExt cx="0" cy="0"/>
+        </a:xfrm>
+      </p:grpSpPr>
+      <p:sp>
+        <p:nvSpPr>
+          <p:cNvPr id="2" name="Kopfzeilenplatzhalter 1"/>
+          <p:cNvSpPr>
+            <a:spLocks noGrp="1"/>
+          </p:cNvSpPr>
+          <p:nvPr>
+            <p:ph type="hdr" sz="quarter"/>
+          </p:nvPr>
+        </p:nvSpPr>
+        <p:spPr>
+          <a:xfrm>
+            <a:off x="0" y="0"/>
+            <a:ext cx="2971800" cy="458788"/>
+          </a:xfrm>
+          <a:prstGeom prst="rect">
+            <a:avLst/>
+          </a:prstGeom>
+        </p:spPr>
+        <p:txBody>
+          <a:bodyPr vert="horz" lIns="91440" tIns="45720" rIns="91440" bIns="45720" rtlCol="0"/>
+          <a:lstStyle>
+            <a:lvl1pPr algn="l">
+              <a:defRPr sz="1200"/>
+            </a:lvl1pPr>
+          </a:lstStyle>
+          <a:p>
+            <a:endParaRPr lang="de-CH"/>
+          </a:p>
+        </p:txBody>
+      </p:sp>
+      <p:sp>
+        <p:nvSpPr>
+          <p:cNvPr id="3" name="Datumsplatzhalter 2"/>
+          <p:cNvSpPr>
+            <a:spLocks noGrp="1"/>
+          </p:cNvSpPr>
+          <p:nvPr>
+            <p:ph type="dt" idx="1"/>
+          </p:nvPr>
+        </p:nvSpPr>
+        <p:spPr>
+          <a:xfrm>
+            <a:off x="3884613" y="0"/>
+            <a:ext cx="2971800" cy="458788"/>
+          </a:xfrm>
+          <a:prstGeom prst="rect">
+            <a:avLst/>
+          </a:prstGeom>
+        </p:spPr>
+        <p:txBody>
+          <a:bodyPr vert="horz" lIns="91440" tIns="45720" rIns="91440" bIns="45720" rtlCol="0"/>
+          <a:lstStyle>
+            <a:lvl1pPr algn="r">
+              <a:defRPr sz="1200"/>
+            </a:lvl1pPr>
+          </a:lstStyle>
+          <a:p>
+            <a:fld id="{B04AB237-0591-4B14-B2B7-A6A725ABAD81}" type="datetimeFigureOut">
+              <a:rPr lang="de-CH" smtClean="0"/>
+              <a:t>16.05.2019</a:t>
+            </a:fld>
+            <a:endParaRPr lang="de-CH"/>
+          </a:p>
+        </p:txBody>
+      </p:sp>
+      <p:sp>
+        <p:nvSpPr>
+          <p:cNvPr id="4" name="Folienbildplatzhalter 3"/>
+          <p:cNvSpPr>
+            <a:spLocks noGrp="1" noRot="1" noChangeAspect="1"/>
+          </p:cNvSpPr>
+          <p:nvPr>
+            <p:ph type="sldImg" idx="2"/>
+          </p:nvPr>
+        </p:nvSpPr>
+        <p:spPr>
+          <a:xfrm>
+            <a:off x="685800" y="1143000"/>
+            <a:ext cx="5486400" cy="3086100"/>
+          </a:xfrm>
+          <a:prstGeom prst="rect">
+            <a:avLst/>
+          </a:prstGeom>
+          <a:noFill/>
+          <a:ln w="12700">
+            <a:solidFill>
+              <a:prstClr val="black"/>
+            </a:solidFill>
+          </a:ln>
+        </p:spPr>
+        <p:txBody>
+          <a:bodyPr vert="horz" lIns="91440" tIns="45720" rIns="91440" bIns="45720" rtlCol="0" anchor="ctr"/>
+          <a:lstStyle/>
+          <a:p>
+            <a:endParaRPr lang="de-CH"/>
+          </a:p>
+        </p:txBody>
+      </p:sp>
+      <p:sp>
+        <p:nvSpPr>
+          <p:cNvPr id="5" name="Notizenplatzhalter 4"/>
+          <p:cNvSpPr>
+            <a:spLocks noGrp="1"/>
+          </p:cNvSpPr>
+          <p:nvPr>
+            <p:ph type="body" sz="quarter" idx="3"/>
+          </p:nvPr>
+        </p:nvSpPr>
+        <p:spPr>
+          <a:xfrm>
+            <a:off x="685800" y="4400550"/>
+            <a:ext cx="5486400" cy="3600450"/>
+          </a:xfrm>
+          <a:prstGeom prst="rect">
+            <a:avLst/>
+          </a:prstGeom>
+        </p:spPr>
+        <p:txBody>
+          <a:bodyPr vert="horz" lIns="91440" tIns="45720" rIns="91440" bIns="45720" rtlCol="0"/>
+          <a:lstStyle/>
+          <a:p>
+            <a:pPr lvl="0"/>
+            <a:r>
+              <a:rPr lang="de-DE"/>
+              <a:t>Mastertextformat bearbeiten</a:t>
+            </a:r>
+          </a:p>
+          <a:p>
+            <a:pPr lvl="1"/>
+            <a:r>
+              <a:rPr lang="de-DE"/>
+              <a:t>Zweite Ebene</a:t>
+            </a:r>
+          </a:p>
+          <a:p>
+            <a:pPr lvl="2"/>
+            <a:r>
+              <a:rPr lang="de-DE"/>
+              <a:t>Dritte Ebene</a:t>
+            </a:r>
+          </a:p>
+          <a:p>
+            <a:pPr lvl="3"/>
+            <a:r>
+              <a:rPr lang="de-DE"/>
+              <a:t>Vierte Ebene</a:t>
+            </a:r>
+          </a:p>
+          <a:p>
+            <a:pPr lvl="4"/>
+            <a:r>
+              <a:rPr lang="de-DE"/>
+              <a:t>Fünfte Ebene</a:t>
+            </a:r>
+            <a:endParaRPr lang="de-CH"/>
+          </a:p>
+        </p:txBody>
+      </p:sp>
+      <p:sp>
+        <p:nvSpPr>
+          <p:cNvPr id="6" name="Fußzeilenplatzhalter 5"/>
+          <p:cNvSpPr>
+            <a:spLocks noGrp="1"/>
+          </p:cNvSpPr>
+          <p:nvPr>
+            <p:ph type="ftr" sz="quarter" idx="4"/>
+          </p:nvPr>
+        </p:nvSpPr>
+        <p:spPr>
+          <a:xfrm>
+            <a:off x="0" y="8685213"/>
+            <a:ext cx="2971800" cy="458787"/>
+          </a:xfrm>
+          <a:prstGeom prst="rect">
+            <a:avLst/>
+          </a:prstGeom>
+        </p:spPr>
+        <p:txBody>
+          <a:bodyPr vert="horz" lIns="91440" tIns="45720" rIns="91440" bIns="45720" rtlCol="0" anchor="b"/>
+          <a:lstStyle>
+            <a:lvl1pPr algn="l">
+              <a:defRPr sz="1200"/>
+            </a:lvl1pPr>
+          </a:lstStyle>
+          <a:p>
+            <a:endParaRPr lang="de-CH"/>
+          </a:p>
+        </p:txBody>
+      </p:sp>
+      <p:sp>
+        <p:nvSpPr>
+          <p:cNvPr id="7" name="Foliennummernplatzhalter 6"/>
+          <p:cNvSpPr>
+            <a:spLocks noGrp="1"/>
+          </p:cNvSpPr>
+          <p:nvPr>
+            <p:ph type="sldNum" sz="quarter" idx="5"/>
+          </p:nvPr>
+        </p:nvSpPr>
+        <p:spPr>
+          <a:xfrm>
+            <a:off x="3884613" y="8685213"/>
+            <a:ext cx="2971800" cy="458787"/>
+          </a:xfrm>
+          <a:prstGeom prst="rect">
+            <a:avLst/>
+          </a:prstGeom>
+        </p:spPr>
+        <p:txBody>
+          <a:bodyPr vert="horz" lIns="91440" tIns="45720" rIns="91440" bIns="45720" rtlCol="0" anchor="b"/>
+          <a:lstStyle>
+            <a:lvl1pPr algn="r">
+              <a:defRPr sz="1200"/>
+            </a:lvl1pPr>
+          </a:lstStyle>
+          <a:p>
+            <a:fld id="{D29B526F-BBC7-453A-B2B0-40FD4B913F49}" type="slidenum">
+              <a:rPr lang="de-CH" smtClean="0"/>
+              <a:t>‹Nr.›</a:t>
+            </a:fld>
+            <a:endParaRPr lang="de-CH"/>
+          </a:p>
+        </p:txBody>
+      </p:sp>
+    </p:spTree>
+    <p:extLst>
+      <p:ext uri="{BB962C8B-B14F-4D97-AF65-F5344CB8AC3E}">
+        <p14:creationId xmlns:p14="http://schemas.microsoft.com/office/powerpoint/2010/main" val="4073857458"/>
+      </p:ext>
+    </p:extLst>
+  </p:cSld>
+  <p:clrMap bg1="lt1" tx1="dk1" bg2="lt2" tx2="dk2" accent1="accent1" accent2="accent2" accent3="accent3" accent4="accent4" accent5="accent5" accent6="accent6" hlink="hlink" folHlink="folHlink"/>
+  <p:notesStyle>
+    <a:lvl1pPr marL="0" algn="l" defTabSz="914400" rtl="0" eaLnBrk="1" latinLnBrk="0" hangingPunct="1">
+      <a:defRPr sz="1200" kern="1200">
+        <a:solidFill>
+          <a:schemeClr val="tx1"/>
+        </a:solidFill>
+        <a:latin typeface="+mn-lt"/>
+        <a:ea typeface="+mn-ea"/>
+        <a:cs typeface="+mn-cs"/>
+      </a:defRPr>
+    </a:lvl1pPr>
+    <a:lvl2pPr marL="457200" algn="l" defTabSz="914400" rtl="0" eaLnBrk="1" latinLnBrk="0" hangingPunct="1">
+      <a:defRPr sz="1200" kern="1200">
+        <a:solidFill>
+          <a:schemeClr val="tx1"/>
+        </a:solidFill>
+        <a:latin typeface="+mn-lt"/>
+        <a:ea typeface="+mn-ea"/>
+        <a:cs typeface="+mn-cs"/>
+      </a:defRPr>
+    </a:lvl2pPr>
+    <a:lvl3pPr marL="914400" algn="l" defTabSz="914400" rtl="0" eaLnBrk="1" latinLnBrk="0" hangingPunct="1">
+      <a:defRPr sz="1200" kern="1200">
+        <a:solidFill>
+          <a:schemeClr val="tx1"/>
+        </a:solidFill>
+        <a:latin typeface="+mn-lt"/>
+        <a:ea typeface="+mn-ea"/>
+        <a:cs typeface="+mn-cs"/>
+      </a:defRPr>
+    </a:lvl3pPr>
+    <a:lvl4pPr marL="1371600" algn="l" defTabSz="914400" rtl="0" eaLnBrk="1" latinLnBrk="0" hangingPunct="1">
+      <a:defRPr sz="1200" kern="1200">
+        <a:solidFill>
+          <a:schemeClr val="tx1"/>
+        </a:solidFill>
+        <a:latin typeface="+mn-lt"/>
+        <a:ea typeface="+mn-ea"/>
+        <a:cs typeface="+mn-cs"/>
+      </a:defRPr>
+    </a:lvl4pPr>
+    <a:lvl5pPr marL="1828800" algn="l" defTabSz="914400" rtl="0" eaLnBrk="1" latinLnBrk="0" hangingPunct="1">
+      <a:defRPr sz="1200" kern="1200">
+        <a:solidFill>
+          <a:schemeClr val="tx1"/>
+        </a:solidFill>
+        <a:latin typeface="+mn-lt"/>
+        <a:ea typeface="+mn-ea"/>
+        <a:cs typeface="+mn-cs"/>
+      </a:defRPr>
+    </a:lvl5pPr>
+    <a:lvl6pPr marL="2286000" algn="l" defTabSz="914400" rtl="0" eaLnBrk="1" latinLnBrk="0" hangingPunct="1">
+      <a:defRPr sz="1200" kern="1200">
+        <a:solidFill>
+          <a:schemeClr val="tx1"/>
+        </a:solidFill>
+        <a:latin typeface="+mn-lt"/>
+        <a:ea typeface="+mn-ea"/>
+        <a:cs typeface="+mn-cs"/>
+      </a:defRPr>
+    </a:lvl6pPr>
+    <a:lvl7pPr marL="2743200" algn="l" defTabSz="914400" rtl="0" eaLnBrk="1" latinLnBrk="0" hangingPunct="1">
+      <a:defRPr sz="1200" kern="1200">
+        <a:solidFill>
+          <a:schemeClr val="tx1"/>
+        </a:solidFill>
+        <a:latin typeface="+mn-lt"/>
+        <a:ea typeface="+mn-ea"/>
+        <a:cs typeface="+mn-cs"/>
+      </a:defRPr>
+    </a:lvl7pPr>
+    <a:lvl8pPr marL="3200400" algn="l" defTabSz="914400" rtl="0" eaLnBrk="1" latinLnBrk="0" hangingPunct="1">
+      <a:defRPr sz="1200" kern="1200">
+        <a:solidFill>
+          <a:schemeClr val="tx1"/>
+        </a:solidFill>
+        <a:latin typeface="+mn-lt"/>
+        <a:ea typeface="+mn-ea"/>
+        <a:cs typeface="+mn-cs"/>
+      </a:defRPr>
+    </a:lvl8pPr>
+    <a:lvl9pPr marL="3657600" algn="l" defTabSz="914400" rtl="0" eaLnBrk="1" latinLnBrk="0" hangingPunct="1">
+      <a:defRPr sz="1200" kern="1200">
+        <a:solidFill>
+          <a:schemeClr val="tx1"/>
+        </a:solidFill>
+        <a:latin typeface="+mn-lt"/>
+        <a:ea typeface="+mn-ea"/>
+        <a:cs typeface="+mn-cs"/>
+      </a:defRPr>
+    </a:lvl9pPr>
+  </p:notesStyle>
+</p:notesMaster>
+</file>
+
+<file path=ppt/notesSlides/notesSlide1.xml><?xml version="1.0" encoding="utf-8"?>
+<p:notes xmlns:a="http://schemas.openxmlformats.org/drawingml/2006/main" xmlns:r="http://schemas.openxmlformats.org/officeDocument/2006/relationships" xmlns:p="http://schemas.openxmlformats.org/presentationml/2006/main">
+  <p:cSld>
+    <p:spTree>
+      <p:nvGrpSpPr>
+        <p:cNvPr id="1" name=""/>
+        <p:cNvGrpSpPr/>
+        <p:nvPr/>
+      </p:nvGrpSpPr>
+      <p:grpSpPr>
+        <a:xfrm>
+          <a:off x="0" y="0"/>
+          <a:ext cx="0" cy="0"/>
+          <a:chOff x="0" y="0"/>
+          <a:chExt cx="0" cy="0"/>
+        </a:xfrm>
+      </p:grpSpPr>
+      <p:sp>
+        <p:nvSpPr>
+          <p:cNvPr id="2" name="Folienbildplatzhalter 1"/>
+          <p:cNvSpPr>
+            <a:spLocks noGrp="1" noRot="1" noChangeAspect="1"/>
+          </p:cNvSpPr>
+          <p:nvPr>
+            <p:ph type="sldImg"/>
+          </p:nvPr>
+        </p:nvSpPr>
+        <p:spPr/>
+      </p:sp>
+      <p:sp>
+        <p:nvSpPr>
+          <p:cNvPr id="3" name="Notizenplatzhalter 2"/>
+          <p:cNvSpPr>
+            <a:spLocks noGrp="1"/>
+          </p:cNvSpPr>
+          <p:nvPr>
+            <p:ph type="body" idx="1"/>
+          </p:nvPr>
+        </p:nvSpPr>
+        <p:spPr/>
+        <p:txBody>
+          <a:bodyPr/>
+          <a:lstStyle/>
+          <a:p>
+            <a:pPr marL="0" marR="0" lvl="0" indent="0" algn="l" defTabSz="914400" rtl="0" eaLnBrk="1" fontAlgn="auto" latinLnBrk="0" hangingPunct="1">
+              <a:lnSpc>
+                <a:spcPct val="100000"/>
+              </a:lnSpc>
+              <a:spcBef>
+                <a:spcPts val="0"/>
+              </a:spcBef>
+              <a:spcAft>
+                <a:spcPts val="0"/>
+              </a:spcAft>
+              <a:buClrTx/>
+              <a:buSzTx/>
+              <a:buFontTx/>
+              <a:buNone/>
+              <a:tabLst/>
+              <a:defRPr/>
+            </a:pPr>
+            <a:r>
+              <a:rPr lang="de-CH" dirty="0"/>
+              <a:t>Die </a:t>
+            </a:r>
+            <a:r>
+              <a:rPr lang="de-CH" dirty="0" err="1"/>
+              <a:t>OpenweatherAPI</a:t>
+            </a:r>
+            <a:r>
+              <a:rPr lang="de-CH" dirty="0"/>
+              <a:t> ist eine sehr verlässliche API, welche sekündliche upgedated wird</a:t>
+            </a:r>
+          </a:p>
+          <a:p>
+            <a:r>
+              <a:rPr lang="de-CH" dirty="0" err="1"/>
+              <a:t>SQLlight</a:t>
+            </a:r>
+            <a:r>
+              <a:rPr lang="de-CH" dirty="0"/>
+              <a:t> ist für eine solche App die optimale Lösung um lokal Daten zu speichern</a:t>
+            </a:r>
+          </a:p>
+          <a:p>
+            <a:r>
+              <a:rPr lang="de-CH" dirty="0"/>
+              <a:t>Mit dem Motto «</a:t>
+            </a:r>
+            <a:r>
+              <a:rPr lang="de-CH" dirty="0" err="1"/>
+              <a:t>less</a:t>
+            </a:r>
+            <a:r>
+              <a:rPr lang="de-CH" dirty="0"/>
+              <a:t> </a:t>
+            </a:r>
+            <a:r>
+              <a:rPr lang="de-CH" dirty="0" err="1"/>
+              <a:t>is</a:t>
+            </a:r>
+            <a:r>
+              <a:rPr lang="de-CH" dirty="0"/>
+              <a:t> </a:t>
+            </a:r>
+            <a:r>
+              <a:rPr lang="de-CH" dirty="0" err="1"/>
+              <a:t>more</a:t>
+            </a:r>
+            <a:r>
+              <a:rPr lang="de-CH" dirty="0"/>
+              <a:t>» wollen wir den Nutzern eine sehr simple Handhabung der App geben, so, dass sie mit wenigen Tastendrücke zum Ziel kommen</a:t>
+            </a:r>
+          </a:p>
+          <a:p>
+            <a:r>
+              <a:rPr lang="de-CH" dirty="0">
+                <a:sym typeface="Wingdings" panose="05000000000000000000" pitchFamily="2" charset="2"/>
+              </a:rPr>
+              <a:t> Voll funktionsfähige Wetter App bei der …, zudem soll das ganze …, bei dem </a:t>
+            </a:r>
+            <a:r>
+              <a:rPr lang="de-CH" dirty="0" err="1">
+                <a:sym typeface="Wingdings" panose="05000000000000000000" pitchFamily="2" charset="2"/>
+              </a:rPr>
+              <a:t>Frantend</a:t>
+            </a:r>
+            <a:r>
+              <a:rPr lang="de-CH" dirty="0">
+                <a:sym typeface="Wingdings" panose="05000000000000000000" pitchFamily="2" charset="2"/>
+              </a:rPr>
+              <a:t> haben wir darauf geachtet dass …, und das haben wir alles nach dem Motto «</a:t>
+            </a:r>
+            <a:r>
+              <a:rPr lang="de-CH" dirty="0" err="1">
+                <a:sym typeface="Wingdings" panose="05000000000000000000" pitchFamily="2" charset="2"/>
+              </a:rPr>
+              <a:t>less</a:t>
+            </a:r>
+            <a:r>
+              <a:rPr lang="de-CH" dirty="0">
+                <a:sym typeface="Wingdings" panose="05000000000000000000" pitchFamily="2" charset="2"/>
+              </a:rPr>
+              <a:t> </a:t>
+            </a:r>
+            <a:r>
+              <a:rPr lang="de-CH" dirty="0" err="1">
+                <a:sym typeface="Wingdings" panose="05000000000000000000" pitchFamily="2" charset="2"/>
+              </a:rPr>
+              <a:t>is</a:t>
+            </a:r>
+            <a:r>
+              <a:rPr lang="de-CH" dirty="0">
+                <a:sym typeface="Wingdings" panose="05000000000000000000" pitchFamily="2" charset="2"/>
+              </a:rPr>
+              <a:t> </a:t>
+            </a:r>
+            <a:r>
+              <a:rPr lang="de-CH" dirty="0" err="1">
+                <a:sym typeface="Wingdings" panose="05000000000000000000" pitchFamily="2" charset="2"/>
+              </a:rPr>
+              <a:t>more</a:t>
+            </a:r>
+            <a:r>
+              <a:rPr lang="de-CH" dirty="0">
+                <a:sym typeface="Wingdings" panose="05000000000000000000" pitchFamily="2" charset="2"/>
+              </a:rPr>
+              <a:t>» implementiert, so, dass …</a:t>
+            </a:r>
+            <a:endParaRPr lang="de-CH" dirty="0"/>
+          </a:p>
+        </p:txBody>
+      </p:sp>
+      <p:sp>
+        <p:nvSpPr>
+          <p:cNvPr id="4" name="Foliennummernplatzhalter 3"/>
+          <p:cNvSpPr>
+            <a:spLocks noGrp="1"/>
+          </p:cNvSpPr>
+          <p:nvPr>
+            <p:ph type="sldNum" sz="quarter" idx="5"/>
+          </p:nvPr>
+        </p:nvSpPr>
+        <p:spPr/>
+        <p:txBody>
+          <a:bodyPr/>
+          <a:lstStyle/>
+          <a:p>
+            <a:fld id="{D29B526F-BBC7-453A-B2B0-40FD4B913F49}" type="slidenum">
+              <a:rPr lang="de-CH" smtClean="0"/>
+              <a:t>3</a:t>
+            </a:fld>
+            <a:endParaRPr lang="de-CH"/>
+          </a:p>
+        </p:txBody>
+      </p:sp>
+    </p:spTree>
+    <p:extLst>
+      <p:ext uri="{BB962C8B-B14F-4D97-AF65-F5344CB8AC3E}">
+        <p14:creationId xmlns:p14="http://schemas.microsoft.com/office/powerpoint/2010/main" val="3660403320"/>
+      </p:ext>
+    </p:extLst>
+  </p:cSld>
+  <p:clrMapOvr>
+    <a:masterClrMapping/>
+  </p:clrMapOvr>
+</p:notes>
 </file>
 
 <file path=ppt/slideLayouts/slideLayout1.xml><?xml version="1.0" encoding="utf-8"?>
@@ -6147,6 +6709,42 @@
           <a:chExt cx="0" cy="0"/>
         </a:xfrm>
       </p:grpSpPr>
+      <p:pic>
+        <p:nvPicPr>
+          <p:cNvPr id="5" name="Grafik 4">
+            <a:extLst>
+              <a:ext uri="{FF2B5EF4-FFF2-40B4-BE49-F238E27FC236}">
+                <a16:creationId xmlns:a16="http://schemas.microsoft.com/office/drawing/2014/main" id="{A1D57AC8-5333-4B95-9B44-A504B8415BB5}"/>
+              </a:ext>
+            </a:extLst>
+          </p:cNvPr>
+          <p:cNvPicPr>
+            <a:picLocks noChangeAspect="1"/>
+          </p:cNvPicPr>
+          <p:nvPr/>
+        </p:nvPicPr>
+        <p:blipFill>
+          <a:blip r:embed="rId2">
+            <a:extLst>
+              <a:ext uri="{28A0092B-C50C-407E-A947-70E740481C1C}">
+                <a14:useLocalDpi xmlns:a14="http://schemas.microsoft.com/office/drawing/2010/main" val="0"/>
+              </a:ext>
+            </a:extLst>
+          </a:blip>
+          <a:stretch>
+            <a:fillRect/>
+          </a:stretch>
+        </p:blipFill>
+        <p:spPr>
+          <a:xfrm>
+            <a:off x="-247650" y="-4053059"/>
+            <a:ext cx="11641138" cy="11641138"/>
+          </a:xfrm>
+          <a:prstGeom prst="rect">
+            <a:avLst/>
+          </a:prstGeom>
+        </p:spPr>
+      </p:pic>
       <p:sp>
         <p:nvSpPr>
           <p:cNvPr id="2" name="Titel 1">
@@ -6291,13 +6889,13 @@
           <a:p>
             <a:r>
               <a:rPr lang="de-CH" dirty="0"/>
-              <a:t>Unseres Ergebnis</a:t>
+              <a:t>Unser Ergebnis</a:t>
             </a:r>
           </a:p>
           <a:p>
             <a:r>
               <a:rPr lang="de-CH" dirty="0"/>
-              <a:t>Schwierigkeiten</a:t>
+              <a:t>Herausforderungen</a:t>
             </a:r>
           </a:p>
           <a:p>
@@ -6396,7 +6994,105 @@
           <a:bodyPr/>
           <a:lstStyle/>
           <a:p>
-            <a:endParaRPr lang="de-CH"/>
+            <a:pPr marL="0" indent="0">
+              <a:buNone/>
+            </a:pPr>
+            <a:r>
+              <a:rPr lang="de-CH" dirty="0" err="1"/>
+              <a:t>Sit</a:t>
+            </a:r>
+            <a:r>
+              <a:rPr lang="de-CH" dirty="0"/>
+              <a:t> down, relax and </a:t>
+            </a:r>
+            <a:r>
+              <a:rPr lang="de-CH" dirty="0" err="1"/>
+              <a:t>enjoy</a:t>
+            </a:r>
+            <a:r>
+              <a:rPr lang="de-CH" dirty="0"/>
+              <a:t> </a:t>
+            </a:r>
+            <a:r>
+              <a:rPr lang="de-CH" dirty="0" err="1"/>
+              <a:t>the</a:t>
+            </a:r>
+            <a:r>
+              <a:rPr lang="de-CH" dirty="0"/>
+              <a:t> pure </a:t>
+            </a:r>
+            <a:r>
+              <a:rPr lang="de-CH" dirty="0" err="1"/>
+              <a:t>beauty</a:t>
+            </a:r>
+            <a:r>
+              <a:rPr lang="de-CH" dirty="0"/>
+              <a:t> </a:t>
+            </a:r>
+            <a:r>
+              <a:rPr lang="de-CH" dirty="0" err="1"/>
+              <a:t>of</a:t>
+            </a:r>
+            <a:r>
+              <a:rPr lang="de-CH" dirty="0"/>
+              <a:t> </a:t>
+            </a:r>
+            <a:r>
+              <a:rPr lang="de-CH" dirty="0" err="1"/>
+              <a:t>the</a:t>
+            </a:r>
+            <a:r>
+              <a:rPr lang="de-CH" dirty="0"/>
+              <a:t> </a:t>
+            </a:r>
+            <a:r>
+              <a:rPr lang="de-CH" dirty="0" err="1"/>
+              <a:t>combination</a:t>
+            </a:r>
+            <a:r>
+              <a:rPr lang="de-CH" dirty="0"/>
+              <a:t> </a:t>
+            </a:r>
+            <a:r>
+              <a:rPr lang="de-CH" dirty="0" err="1"/>
+              <a:t>between</a:t>
+            </a:r>
+            <a:r>
+              <a:rPr lang="de-CH" dirty="0"/>
+              <a:t> pro </a:t>
+            </a:r>
+            <a:r>
+              <a:rPr lang="de-CH" dirty="0" err="1"/>
+              <a:t>coding</a:t>
+            </a:r>
+            <a:r>
+              <a:rPr lang="de-CH" dirty="0"/>
+              <a:t> and pro </a:t>
+            </a:r>
+            <a:r>
+              <a:rPr lang="de-CH" dirty="0" err="1"/>
+              <a:t>desgning</a:t>
+            </a:r>
+            <a:r>
+              <a:rPr lang="de-CH" dirty="0"/>
+              <a:t> (</a:t>
+            </a:r>
+            <a:r>
+              <a:rPr lang="de-CH" dirty="0" err="1"/>
+              <a:t>a.k.a</a:t>
+            </a:r>
+            <a:r>
+              <a:rPr lang="de-CH" dirty="0"/>
+              <a:t>. </a:t>
+            </a:r>
+            <a:r>
+              <a:rPr lang="de-CH" dirty="0" err="1"/>
+              <a:t>legendness</a:t>
+            </a:r>
+            <a:r>
+              <a:rPr lang="de-CH" dirty="0"/>
+              <a:t>)</a:t>
+            </a:r>
           </a:p>
         </p:txBody>
       </p:sp>
@@ -6487,13 +7183,13 @@
           <a:p>
             <a:r>
               <a:rPr lang="de-CH" dirty="0"/>
-              <a:t>Unseres Ergebnis</a:t>
+              <a:t>Unser Ergebnis</a:t>
             </a:r>
           </a:p>
           <a:p>
             <a:r>
               <a:rPr lang="de-CH" dirty="0"/>
-              <a:t>Schwierigkeiten</a:t>
+              <a:t>Herausforderungen</a:t>
             </a:r>
           </a:p>
           <a:p>
@@ -6543,6 +7239,42 @@
           <a:chExt cx="0" cy="0"/>
         </a:xfrm>
       </p:grpSpPr>
+      <p:pic>
+        <p:nvPicPr>
+          <p:cNvPr id="5" name="Grafik 4">
+            <a:extLst>
+              <a:ext uri="{FF2B5EF4-FFF2-40B4-BE49-F238E27FC236}">
+                <a16:creationId xmlns:a16="http://schemas.microsoft.com/office/drawing/2014/main" id="{515FA391-576F-4C56-8D74-8A43FEC270C6}"/>
+              </a:ext>
+            </a:extLst>
+          </p:cNvPr>
+          <p:cNvPicPr>
+            <a:picLocks noChangeAspect="1"/>
+          </p:cNvPicPr>
+          <p:nvPr/>
+        </p:nvPicPr>
+        <p:blipFill>
+          <a:blip r:embed="rId3">
+            <a:extLst>
+              <a:ext uri="{28A0092B-C50C-407E-A947-70E740481C1C}">
+                <a14:useLocalDpi xmlns:a14="http://schemas.microsoft.com/office/drawing/2010/main" val="0"/>
+              </a:ext>
+            </a:extLst>
+          </a:blip>
+          <a:stretch>
+            <a:fillRect/>
+          </a:stretch>
+        </p:blipFill>
+        <p:spPr>
+          <a:xfrm>
+            <a:off x="2767623" y="1893345"/>
+            <a:ext cx="8629475" cy="4822878"/>
+          </a:xfrm>
+          <a:prstGeom prst="rect">
+            <a:avLst/>
+          </a:prstGeom>
+        </p:spPr>
+      </p:pic>
       <p:sp>
         <p:nvSpPr>
           <p:cNvPr id="2" name="Titel 1">
@@ -6593,37 +7325,106 @@
           <a:lstStyle/>
           <a:p>
             <a:pPr lvl="1">
-              <a:buFontTx/>
+              <a:buFont typeface="Symbol" panose="05050102010706020507" pitchFamily="18" charset="2"/>
               <a:buChar char="-"/>
             </a:pPr>
             <a:r>
               <a:rPr lang="de-CH" dirty="0"/>
-              <a:t>Wetter App</a:t>
-            </a:r>
+              <a:t>Voll funktionsfähige Wetter </a:t>
+            </a:r>
+            <a:r>
+              <a:rPr lang="de-CH" dirty="0" err="1"/>
+              <a:t>app</a:t>
+            </a:r>
+            <a:endParaRPr lang="de-CH" dirty="0"/>
           </a:p>
           <a:p>
             <a:pPr lvl="1">
-              <a:buFontTx/>
+              <a:buFont typeface="Symbol" panose="05050102010706020507" pitchFamily="18" charset="2"/>
               <a:buChar char="-"/>
             </a:pPr>
             <a:r>
               <a:rPr lang="de-CH" dirty="0"/>
-              <a:t>Daten von </a:t>
+              <a:t>Jederzeit Zugriff auf die aktuellsten Wetter Daten</a:t>
+            </a:r>
+          </a:p>
+          <a:p>
+            <a:pPr lvl="1">
+              <a:buFont typeface="Symbol" panose="05050102010706020507" pitchFamily="18" charset="2"/>
+              <a:buChar char="-"/>
+            </a:pPr>
+            <a:r>
+              <a:rPr lang="de-CH" dirty="0"/>
+              <a:t>Lokale Speicherfunktion deiner Lieblings Städte </a:t>
+            </a:r>
+          </a:p>
+          <a:p>
+            <a:pPr lvl="1">
+              <a:buFont typeface="Symbol" panose="05050102010706020507" pitchFamily="18" charset="2"/>
+              <a:buChar char="-"/>
+            </a:pPr>
+            <a:r>
+              <a:rPr lang="de-CH" dirty="0"/>
+              <a:t>Übersichtliches &amp; klares Frontend</a:t>
+            </a:r>
+          </a:p>
+          <a:p>
+            <a:pPr lvl="1">
+              <a:buFont typeface="Symbol" panose="05050102010706020507" pitchFamily="18" charset="2"/>
+              <a:buChar char="-"/>
+            </a:pPr>
+            <a:r>
+              <a:rPr lang="de-CH" dirty="0"/>
+              <a:t>Motto «</a:t>
             </a:r>
             <a:r>
               <a:rPr lang="de-CH" dirty="0" err="1"/>
-              <a:t>OpenWeather</a:t>
-            </a:r>
-            <a:r>
-              <a:rPr lang="de-CH"/>
-              <a:t> API</a:t>
-            </a:r>
+              <a:t>less</a:t>
+            </a:r>
+            <a:r>
+              <a:rPr lang="de-CH" dirty="0"/>
+              <a:t> </a:t>
+            </a:r>
+            <a:r>
+              <a:rPr lang="de-CH" dirty="0" err="1"/>
+              <a:t>is</a:t>
+            </a:r>
+            <a:r>
+              <a:rPr lang="de-CH" dirty="0"/>
+              <a:t> </a:t>
+            </a:r>
+            <a:r>
+              <a:rPr lang="de-CH" dirty="0" err="1"/>
+              <a:t>more</a:t>
+            </a:r>
+            <a:r>
+              <a:rPr lang="de-CH" dirty="0"/>
+              <a:t>»</a:t>
+            </a:r>
+          </a:p>
+          <a:p>
+            <a:pPr lvl="1">
+              <a:buFont typeface="Symbol" panose="05050102010706020507" pitchFamily="18" charset="2"/>
+              <a:buChar char="-"/>
+            </a:pPr>
             <a:endParaRPr lang="de-CH" dirty="0"/>
           </a:p>
           <a:p>
             <a:pPr lvl="1">
-              <a:buFontTx/>
+              <a:buFont typeface="Symbol" panose="05050102010706020507" pitchFamily="18" charset="2"/>
               <a:buChar char="-"/>
+            </a:pPr>
+            <a:endParaRPr lang="de-CH" dirty="0"/>
+          </a:p>
+          <a:p>
+            <a:pPr marL="457200" lvl="1" indent="0">
+              <a:buNone/>
+            </a:pPr>
+            <a:endParaRPr lang="de-CH" dirty="0"/>
+          </a:p>
+          <a:p>
+            <a:pPr marL="457200" lvl="1" indent="0">
+              <a:buNone/>
             </a:pPr>
             <a:endParaRPr lang="de-CH" dirty="0"/>
           </a:p>
@@ -6716,13 +7517,13 @@
           <a:p>
             <a:r>
               <a:rPr lang="de-CH" b="1" dirty="0"/>
-              <a:t>Unseres Ergebnis</a:t>
+              <a:t>Unser Ergebnis</a:t>
             </a:r>
           </a:p>
           <a:p>
             <a:r>
               <a:rPr lang="de-CH" dirty="0"/>
-              <a:t>Schwierigkeiten</a:t>
+              <a:t>Herausforderungen</a:t>
             </a:r>
           </a:p>
           <a:p>
@@ -6795,41 +7596,83 @@
           <a:p>
             <a:r>
               <a:rPr lang="de-CH" dirty="0"/>
-              <a:t>Unseres </a:t>
-            </a:r>
-            <a:r>
-              <a:rPr lang="de-CH" dirty="0" err="1"/>
-              <a:t>Ergegnis</a:t>
-            </a:r>
-            <a:endParaRPr lang="de-CH" dirty="0"/>
-          </a:p>
-        </p:txBody>
-      </p:sp>
-      <p:sp>
-        <p:nvSpPr>
-          <p:cNvPr id="3" name="Inhaltsplatzhalter 2">
+              <a:t>Unser Ergebnis</a:t>
+            </a:r>
+          </a:p>
+        </p:txBody>
+      </p:sp>
+      <p:pic>
+        <p:nvPicPr>
+          <p:cNvPr id="5" name="Grafik 4">
             <a:extLst>
               <a:ext uri="{FF2B5EF4-FFF2-40B4-BE49-F238E27FC236}">
-                <a16:creationId xmlns:a16="http://schemas.microsoft.com/office/drawing/2014/main" id="{EA002EDA-D479-4937-8C25-E3BD7FE885FF}"/>
+                <a16:creationId xmlns:a16="http://schemas.microsoft.com/office/drawing/2014/main" id="{658DD90D-C8A6-481B-B00E-CB9963CB1243}"/>
               </a:ext>
             </a:extLst>
           </p:cNvPr>
-          <p:cNvSpPr>
-            <a:spLocks noGrp="1"/>
-          </p:cNvSpPr>
-          <p:nvPr>
-            <p:ph sz="quarter" idx="13"/>
-          </p:nvPr>
-        </p:nvSpPr>
-        <p:spPr/>
-        <p:txBody>
-          <a:bodyPr/>
-          <a:lstStyle/>
-          <a:p>
-            <a:endParaRPr lang="de-CH"/>
-          </a:p>
-        </p:txBody>
-      </p:sp>
+          <p:cNvPicPr>
+            <a:picLocks noChangeAspect="1"/>
+          </p:cNvPicPr>
+          <p:nvPr/>
+        </p:nvPicPr>
+        <p:blipFill>
+          <a:blip r:embed="rId2">
+            <a:extLst>
+              <a:ext uri="{28A0092B-C50C-407E-A947-70E740481C1C}">
+                <a14:useLocalDpi xmlns:a14="http://schemas.microsoft.com/office/drawing/2010/main" val="0"/>
+              </a:ext>
+            </a:extLst>
+          </a:blip>
+          <a:stretch>
+            <a:fillRect/>
+          </a:stretch>
+        </p:blipFill>
+        <p:spPr>
+          <a:xfrm>
+            <a:off x="9163675" y="359330"/>
+            <a:ext cx="2114550" cy="2114550"/>
+          </a:xfrm>
+          <a:prstGeom prst="rect">
+            <a:avLst/>
+          </a:prstGeom>
+        </p:spPr>
+      </p:pic>
+      <p:pic>
+        <p:nvPicPr>
+          <p:cNvPr id="7" name="Grafik 6">
+            <a:extLst>
+              <a:ext uri="{FF2B5EF4-FFF2-40B4-BE49-F238E27FC236}">
+                <a16:creationId xmlns:a16="http://schemas.microsoft.com/office/drawing/2014/main" id="{38DDE810-23B4-4370-A205-F87FD5CBCED0}"/>
+              </a:ext>
+            </a:extLst>
+          </p:cNvPr>
+          <p:cNvPicPr>
+            <a:picLocks noChangeAspect="1"/>
+          </p:cNvPicPr>
+          <p:nvPr/>
+        </p:nvPicPr>
+        <p:blipFill>
+          <a:blip r:embed="rId3">
+            <a:extLst>
+              <a:ext uri="{28A0092B-C50C-407E-A947-70E740481C1C}">
+                <a14:useLocalDpi xmlns:a14="http://schemas.microsoft.com/office/drawing/2010/main" val="0"/>
+              </a:ext>
+            </a:extLst>
+          </a:blip>
+          <a:stretch>
+            <a:fillRect/>
+          </a:stretch>
+        </p:blipFill>
+        <p:spPr>
+          <a:xfrm>
+            <a:off x="209550" y="4636855"/>
+            <a:ext cx="4514850" cy="2140791"/>
+          </a:xfrm>
+          <a:prstGeom prst="rect">
+            <a:avLst/>
+          </a:prstGeom>
+        </p:spPr>
+      </p:pic>
     </p:spTree>
     <p:extLst>
       <p:ext uri="{BB962C8B-B14F-4D97-AF65-F5344CB8AC3E}">
@@ -6917,14 +7760,15 @@
           <a:p>
             <a:r>
               <a:rPr lang="de-CH" dirty="0"/>
-              <a:t>Unseres Ergebnis</a:t>
-            </a:r>
-          </a:p>
-          <a:p>
-            <a:r>
-              <a:rPr lang="de-CH" b="1" dirty="0"/>
-              <a:t>Schwierigkeiten</a:t>
-            </a:r>
+              <a:t>Unser Ergebnis</a:t>
+            </a:r>
+          </a:p>
+          <a:p>
+            <a:r>
+              <a:rPr lang="de-CH" dirty="0"/>
+              <a:t>Herausforderungen</a:t>
+            </a:r>
+            <a:endParaRPr lang="de-CH" b="1" dirty="0"/>
           </a:p>
           <a:p>
             <a:r>
@@ -6973,6 +7817,42 @@
           <a:chExt cx="0" cy="0"/>
         </a:xfrm>
       </p:grpSpPr>
+      <p:pic>
+        <p:nvPicPr>
+          <p:cNvPr id="7" name="Grafik 6" descr="Ein Bild, das Person, Mann enthält.&#10;&#10;Automatisch generierte Beschreibung">
+            <a:extLst>
+              <a:ext uri="{FF2B5EF4-FFF2-40B4-BE49-F238E27FC236}">
+                <a16:creationId xmlns:a16="http://schemas.microsoft.com/office/drawing/2014/main" id="{D34029FC-786D-4ED4-A51A-A238510F792E}"/>
+              </a:ext>
+            </a:extLst>
+          </p:cNvPr>
+          <p:cNvPicPr>
+            <a:picLocks noChangeAspect="1"/>
+          </p:cNvPicPr>
+          <p:nvPr/>
+        </p:nvPicPr>
+        <p:blipFill>
+          <a:blip r:embed="rId2">
+            <a:extLst>
+              <a:ext uri="{28A0092B-C50C-407E-A947-70E740481C1C}">
+                <a14:useLocalDpi xmlns:a14="http://schemas.microsoft.com/office/drawing/2010/main" val="0"/>
+              </a:ext>
+            </a:extLst>
+          </a:blip>
+          <a:stretch>
+            <a:fillRect/>
+          </a:stretch>
+        </p:blipFill>
+        <p:spPr>
+          <a:xfrm>
+            <a:off x="3843338" y="2214694"/>
+            <a:ext cx="8348662" cy="4523828"/>
+          </a:xfrm>
+          <a:prstGeom prst="rect">
+            <a:avLst/>
+          </a:prstGeom>
+        </p:spPr>
+      </p:pic>
       <p:sp>
         <p:nvSpPr>
           <p:cNvPr id="2" name="Titel 1">
@@ -6989,14 +7869,19 @@
             <p:ph type="title"/>
           </p:nvPr>
         </p:nvSpPr>
-        <p:spPr/>
+        <p:spPr>
+          <a:xfrm>
+            <a:off x="913775" y="618517"/>
+            <a:ext cx="10364451" cy="1596177"/>
+          </a:xfrm>
+        </p:spPr>
         <p:txBody>
           <a:bodyPr/>
           <a:lstStyle/>
           <a:p>
             <a:r>
               <a:rPr lang="de-CH" dirty="0"/>
-              <a:t>Schwierigkeiten</a:t>
+              <a:t>Herausforderungen</a:t>
             </a:r>
           </a:p>
         </p:txBody>
@@ -7017,12 +7902,46 @@
             <p:ph sz="quarter" idx="13"/>
           </p:nvPr>
         </p:nvSpPr>
-        <p:spPr/>
+        <p:spPr>
+          <a:xfrm>
+            <a:off x="913774" y="2367092"/>
+            <a:ext cx="10363826" cy="3424107"/>
+          </a:xfrm>
+        </p:spPr>
         <p:txBody>
           <a:bodyPr/>
           <a:lstStyle/>
           <a:p>
-            <a:endParaRPr lang="de-CH"/>
+            <a:pPr>
+              <a:buFont typeface="Symbol" panose="05050102010706020507" pitchFamily="18" charset="2"/>
+              <a:buChar char="-"/>
+            </a:pPr>
+            <a:r>
+              <a:rPr lang="de-CH" dirty="0"/>
+              <a:t>Scrollen bei Horizontalen </a:t>
+            </a:r>
+            <a:r>
+              <a:rPr lang="de-CH" dirty="0" err="1"/>
+              <a:t>Listviews</a:t>
+            </a:r>
+            <a:endParaRPr lang="de-CH" dirty="0"/>
+          </a:p>
+          <a:p>
+            <a:pPr>
+              <a:buFont typeface="Symbol" panose="05050102010706020507" pitchFamily="18" charset="2"/>
+              <a:buChar char="-"/>
+            </a:pPr>
+            <a:r>
+              <a:rPr lang="de-CH" dirty="0"/>
+              <a:t>Ländersuche</a:t>
+            </a:r>
+          </a:p>
+          <a:p>
+            <a:pPr>
+              <a:buFont typeface="Symbol" panose="05050102010706020507" pitchFamily="18" charset="2"/>
+              <a:buChar char="-"/>
+            </a:pPr>
+            <a:endParaRPr lang="de-CH" dirty="0"/>
           </a:p>
         </p:txBody>
       </p:sp>
@@ -7113,13 +8032,13 @@
           <a:p>
             <a:r>
               <a:rPr lang="de-CH" dirty="0"/>
-              <a:t>Unseres Ergebnis</a:t>
+              <a:t>Unser Ergebnis</a:t>
             </a:r>
           </a:p>
           <a:p>
             <a:r>
               <a:rPr lang="de-CH" dirty="0"/>
-              <a:t>Schwierigkeiten</a:t>
+              <a:t>Herausforderungen</a:t>
             </a:r>
           </a:p>
           <a:p>
@@ -7218,7 +8137,196 @@
           <a:bodyPr/>
           <a:lstStyle/>
           <a:p>
-            <a:endParaRPr lang="de-CH"/>
+            <a:r>
+              <a:rPr lang="de-CH" dirty="0"/>
+              <a:t>Pageviewer</a:t>
+            </a:r>
+          </a:p>
+        </p:txBody>
+      </p:sp>
+      <p:sp>
+        <p:nvSpPr>
+          <p:cNvPr id="6" name="Parallelogramm 5">
+            <a:extLst>
+              <a:ext uri="{FF2B5EF4-FFF2-40B4-BE49-F238E27FC236}">
+                <a16:creationId xmlns:a16="http://schemas.microsoft.com/office/drawing/2014/main" id="{54D5CF59-395F-47C1-A401-F719498C35FD}"/>
+              </a:ext>
+            </a:extLst>
+          </p:cNvPr>
+          <p:cNvSpPr/>
+          <p:nvPr/>
+        </p:nvSpPr>
+        <p:spPr>
+          <a:xfrm>
+            <a:off x="6686550" y="3062417"/>
+            <a:ext cx="2756176" cy="3086100"/>
+          </a:xfrm>
+          <a:prstGeom prst="parallelogram">
+            <a:avLst/>
+          </a:prstGeom>
+          <a:blipFill dpi="0" rotWithShape="1">
+            <a:blip r:embed="rId2">
+              <a:extLst>
+                <a:ext uri="{28A0092B-C50C-407E-A947-70E740481C1C}">
+                  <a14:useLocalDpi xmlns:a14="http://schemas.microsoft.com/office/drawing/2010/main" val="0"/>
+                </a:ext>
+              </a:extLst>
+            </a:blip>
+            <a:srcRect/>
+            <a:stretch>
+              <a:fillRect l="-85275" r="-84743"/>
+            </a:stretch>
+          </a:blipFill>
+          <a:ln>
+            <a:noFill/>
+          </a:ln>
+        </p:spPr>
+        <p:style>
+          <a:lnRef idx="2">
+            <a:schemeClr val="accent1">
+              <a:shade val="50000"/>
+            </a:schemeClr>
+          </a:lnRef>
+          <a:fillRef idx="1">
+            <a:schemeClr val="accent1"/>
+          </a:fillRef>
+          <a:effectRef idx="0">
+            <a:schemeClr val="accent1"/>
+          </a:effectRef>
+          <a:fontRef idx="minor">
+            <a:schemeClr val="lt1"/>
+          </a:fontRef>
+        </p:style>
+        <p:txBody>
+          <a:bodyPr rtlCol="0" anchor="ctr"/>
+          <a:lstStyle/>
+          <a:p>
+            <a:pPr algn="ctr"/>
+            <a:endParaRPr lang="de-CH" dirty="0"/>
+          </a:p>
+        </p:txBody>
+      </p:sp>
+      <p:sp>
+        <p:nvSpPr>
+          <p:cNvPr id="7" name="Parallelogramm 6">
+            <a:extLst>
+              <a:ext uri="{FF2B5EF4-FFF2-40B4-BE49-F238E27FC236}">
+                <a16:creationId xmlns:a16="http://schemas.microsoft.com/office/drawing/2014/main" id="{55257E93-B719-40E0-83E7-D03D8BDB11C8}"/>
+              </a:ext>
+            </a:extLst>
+          </p:cNvPr>
+          <p:cNvSpPr/>
+          <p:nvPr/>
+        </p:nvSpPr>
+        <p:spPr>
+          <a:xfrm>
+            <a:off x="8898384" y="3062417"/>
+            <a:ext cx="2880000" cy="3086100"/>
+          </a:xfrm>
+          <a:prstGeom prst="parallelogram">
+            <a:avLst/>
+          </a:prstGeom>
+          <a:blipFill dpi="0" rotWithShape="1">
+            <a:blip r:embed="rId2">
+              <a:extLst>
+                <a:ext uri="{28A0092B-C50C-407E-A947-70E740481C1C}">
+                  <a14:useLocalDpi xmlns:a14="http://schemas.microsoft.com/office/drawing/2010/main" val="0"/>
+                </a:ext>
+              </a:extLst>
+            </a:blip>
+            <a:srcRect/>
+            <a:stretch>
+              <a:fillRect l="-158410"/>
+            </a:stretch>
+          </a:blipFill>
+          <a:ln>
+            <a:noFill/>
+          </a:ln>
+        </p:spPr>
+        <p:style>
+          <a:lnRef idx="2">
+            <a:schemeClr val="accent1">
+              <a:shade val="50000"/>
+            </a:schemeClr>
+          </a:lnRef>
+          <a:fillRef idx="1">
+            <a:schemeClr val="accent1"/>
+          </a:fillRef>
+          <a:effectRef idx="0">
+            <a:schemeClr val="accent1"/>
+          </a:effectRef>
+          <a:fontRef idx="minor">
+            <a:schemeClr val="lt1"/>
+          </a:fontRef>
+        </p:style>
+        <p:txBody>
+          <a:bodyPr rtlCol="0" anchor="ctr"/>
+          <a:lstStyle/>
+          <a:p>
+            <a:pPr algn="ctr"/>
+            <a:endParaRPr lang="de-CH" dirty="0"/>
+          </a:p>
+        </p:txBody>
+      </p:sp>
+      <p:sp>
+        <p:nvSpPr>
+          <p:cNvPr id="5" name="Parallelogramm 4">
+            <a:extLst>
+              <a:ext uri="{FF2B5EF4-FFF2-40B4-BE49-F238E27FC236}">
+                <a16:creationId xmlns:a16="http://schemas.microsoft.com/office/drawing/2014/main" id="{1A466FB1-CDE2-4B4C-8F07-99C4176F3644}"/>
+              </a:ext>
+            </a:extLst>
+          </p:cNvPr>
+          <p:cNvSpPr/>
+          <p:nvPr/>
+        </p:nvSpPr>
+        <p:spPr>
+          <a:xfrm>
+            <a:off x="4336189" y="3062417"/>
+            <a:ext cx="2880000" cy="3086100"/>
+          </a:xfrm>
+          <a:prstGeom prst="parallelogram">
+            <a:avLst/>
+          </a:prstGeom>
+          <a:blipFill dpi="0" rotWithShape="1">
+            <a:blip r:embed="rId2">
+              <a:extLst>
+                <a:ext uri="{28A0092B-C50C-407E-A947-70E740481C1C}">
+                  <a14:useLocalDpi xmlns:a14="http://schemas.microsoft.com/office/drawing/2010/main" val="0"/>
+                </a:ext>
+              </a:extLst>
+            </a:blip>
+            <a:srcRect/>
+            <a:stretch>
+              <a:fillRect r="-158410"/>
+            </a:stretch>
+          </a:blipFill>
+          <a:ln>
+            <a:noFill/>
+          </a:ln>
+        </p:spPr>
+        <p:style>
+          <a:lnRef idx="2">
+            <a:schemeClr val="accent1">
+              <a:shade val="50000"/>
+            </a:schemeClr>
+          </a:lnRef>
+          <a:fillRef idx="1">
+            <a:schemeClr val="accent1"/>
+          </a:fillRef>
+          <a:effectRef idx="0">
+            <a:schemeClr val="accent1"/>
+          </a:effectRef>
+          <a:fontRef idx="minor">
+            <a:schemeClr val="lt1"/>
+          </a:fontRef>
+        </p:style>
+        <p:txBody>
+          <a:bodyPr rtlCol="0" anchor="ctr"/>
+          <a:lstStyle/>
+          <a:p>
+            <a:pPr algn="ctr"/>
+            <a:endParaRPr lang="de-CH" dirty="0"/>
           </a:p>
         </p:txBody>
       </p:sp>
@@ -7497,4 +8605,299 @@
     </a:ext>
   </a:extLst>
 </a:theme>
+</file>
+
+<file path=ppt/theme/theme2.xml><?xml version="1.0" encoding="utf-8"?>
+<a:theme xmlns:a="http://schemas.openxmlformats.org/drawingml/2006/main" name="Office">
+  <a:themeElements>
+    <a:clrScheme name="Office">
+      <a:dk1>
+        <a:sysClr val="windowText" lastClr="000000"/>
+      </a:dk1>
+      <a:lt1>
+        <a:sysClr val="window" lastClr="FFFFFF"/>
+      </a:lt1>
+      <a:dk2>
+        <a:srgbClr val="44546A"/>
+      </a:dk2>
+      <a:lt2>
+        <a:srgbClr val="E7E6E6"/>
+      </a:lt2>
+      <a:accent1>
+        <a:srgbClr val="4472C4"/>
+      </a:accent1>
+      <a:accent2>
+        <a:srgbClr val="ED7D31"/>
+      </a:accent2>
+      <a:accent3>
+        <a:srgbClr val="A5A5A5"/>
+      </a:accent3>
+      <a:accent4>
+        <a:srgbClr val="FFC000"/>
+      </a:accent4>
+      <a:accent5>
+        <a:srgbClr val="5B9BD5"/>
+      </a:accent5>
+      <a:accent6>
+        <a:srgbClr val="70AD47"/>
+      </a:accent6>
+      <a:hlink>
+        <a:srgbClr val="0563C1"/>
+      </a:hlink>
+      <a:folHlink>
+        <a:srgbClr val="954F72"/>
+      </a:folHlink>
+    </a:clrScheme>
+    <a:fontScheme name="Office">
+      <a:majorFont>
+        <a:latin typeface="Calibri Light" panose="020F0302020204030204"/>
+        <a:ea typeface=""/>
+        <a:cs typeface=""/>
+        <a:font script="Jpan" typeface="游ゴシック Light"/>
+        <a:font script="Hang" typeface="맑은 고딕"/>
+        <a:font script="Hans" typeface="等线 Light"/>
+        <a:font script="Hant" typeface="新細明體"/>
+        <a:font script="Arab" typeface="Times New Roman"/>
+        <a:font script="Hebr" typeface="Times New Roman"/>
+        <a:font script="Thai" typeface="Angsana New"/>
+        <a:font script="Ethi" typeface="Nyala"/>
+        <a:font script="Beng" typeface="Vrinda"/>
+        <a:font script="Gujr" typeface="Shruti"/>
+        <a:font script="Khmr" typeface="MoolBoran"/>
+        <a:font script="Knda" typeface="Tunga"/>
+        <a:font script="Guru" typeface="Raavi"/>
+        <a:font script="Cans" typeface="Euphemia"/>
+        <a:font script="Cher" typeface="Plantagenet Cherokee"/>
+        <a:font script="Yiii" typeface="Microsoft Yi Baiti"/>
+        <a:font script="Tibt" typeface="Microsoft Himalaya"/>
+        <a:font script="Thaa" typeface="MV Boli"/>
+        <a:font script="Deva" typeface="Mangal"/>
+        <a:font script="Telu" typeface="Gautami"/>
+        <a:font script="Taml" typeface="Latha"/>
+        <a:font script="Syrc" typeface="Estrangelo Edessa"/>
+        <a:font script="Orya" typeface="Kalinga"/>
+        <a:font script="Mlym" typeface="Kartika"/>
+        <a:font script="Laoo" typeface="DokChampa"/>
+        <a:font script="Sinh" typeface="Iskoola Pota"/>
+        <a:font script="Mong" typeface="Mongolian Baiti"/>
+        <a:font script="Viet" typeface="Times New Roman"/>
+        <a:font script="Uigh" typeface="Microsoft Uighur"/>
+        <a:font script="Geor" typeface="Sylfaen"/>
+        <a:font script="Armn" typeface="Arial"/>
+        <a:font script="Bugi" typeface="Leelawadee UI"/>
+        <a:font script="Bopo" typeface="Microsoft JhengHei"/>
+        <a:font script="Java" typeface="Javanese Text"/>
+        <a:font script="Lisu" typeface="Segoe UI"/>
+        <a:font script="Mymr" typeface="Myanmar Text"/>
+        <a:font script="Nkoo" typeface="Ebrima"/>
+        <a:font script="Olck" typeface="Nirmala UI"/>
+        <a:font script="Osma" typeface="Ebrima"/>
+        <a:font script="Phag" typeface="Phagspa"/>
+        <a:font script="Syrn" typeface="Estrangelo Edessa"/>
+        <a:font script="Syrj" typeface="Estrangelo Edessa"/>
+        <a:font script="Syre" typeface="Estrangelo Edessa"/>
+        <a:font script="Sora" typeface="Nirmala UI"/>
+        <a:font script="Tale" typeface="Microsoft Tai Le"/>
+        <a:font script="Talu" typeface="Microsoft New Tai Lue"/>
+        <a:font script="Tfng" typeface="Ebrima"/>
+      </a:majorFont>
+      <a:minorFont>
+        <a:latin typeface="Calibri" panose="020F0502020204030204"/>
+        <a:ea typeface=""/>
+        <a:cs typeface=""/>
+        <a:font script="Jpan" typeface="游ゴシック"/>
+        <a:font script="Hang" typeface="맑은 고딕"/>
+        <a:font script="Hans" typeface="等线"/>
+        <a:font script="Hant" typeface="新細明體"/>
+        <a:font script="Arab" typeface="Arial"/>
+        <a:font script="Hebr" typeface="Arial"/>
+        <a:font script="Thai" typeface="Cordia New"/>
+        <a:font script="Ethi" typeface="Nyala"/>
+        <a:font script="Beng" typeface="Vrinda"/>
+        <a:font script="Gujr" typeface="Shruti"/>
+        <a:font script="Khmr" typeface="DaunPenh"/>
+        <a:font script="Knda" typeface="Tunga"/>
+        <a:font script="Guru" typeface="Raavi"/>
+        <a:font script="Cans" typeface="Euphemia"/>
+        <a:font script="Cher" typeface="Plantagenet Cherokee"/>
+        <a:font script="Yiii" typeface="Microsoft Yi Baiti"/>
+        <a:font script="Tibt" typeface="Microsoft Himalaya"/>
+        <a:font script="Thaa" typeface="MV Boli"/>
+        <a:font script="Deva" typeface="Mangal"/>
+        <a:font script="Telu" typeface="Gautami"/>
+        <a:font script="Taml" typeface="Latha"/>
+        <a:font script="Syrc" typeface="Estrangelo Edessa"/>
+        <a:font script="Orya" typeface="Kalinga"/>
+        <a:font script="Mlym" typeface="Kartika"/>
+        <a:font script="Laoo" typeface="DokChampa"/>
+        <a:font script="Sinh" typeface="Iskoola Pota"/>
+        <a:font script="Mong" typeface="Mongolian Baiti"/>
+        <a:font script="Viet" typeface="Arial"/>
+        <a:font script="Uigh" typeface="Microsoft Uighur"/>
+        <a:font script="Geor" typeface="Sylfaen"/>
+        <a:font script="Armn" typeface="Arial"/>
+        <a:font script="Bugi" typeface="Leelawadee UI"/>
+        <a:font script="Bopo" typeface="Microsoft JhengHei"/>
+        <a:font script="Java" typeface="Javanese Text"/>
+        <a:font script="Lisu" typeface="Segoe UI"/>
+        <a:font script="Mymr" typeface="Myanmar Text"/>
+        <a:font script="Nkoo" typeface="Ebrima"/>
+        <a:font script="Olck" typeface="Nirmala UI"/>
+        <a:font script="Osma" typeface="Ebrima"/>
+        <a:font script="Phag" typeface="Phagspa"/>
+        <a:font script="Syrn" typeface="Estrangelo Edessa"/>
+        <a:font script="Syrj" typeface="Estrangelo Edessa"/>
+        <a:font script="Syre" typeface="Estrangelo Edessa"/>
+        <a:font script="Sora" typeface="Nirmala UI"/>
+        <a:font script="Tale" typeface="Microsoft Tai Le"/>
+        <a:font script="Talu" typeface="Microsoft New Tai Lue"/>
+        <a:font script="Tfng" typeface="Ebrima"/>
+      </a:minorFont>
+    </a:fontScheme>
+    <a:fmtScheme name="Office">
+      <a:fillStyleLst>
+        <a:solidFill>
+          <a:schemeClr val="phClr"/>
+        </a:solidFill>
+        <a:gradFill rotWithShape="1">
+          <a:gsLst>
+            <a:gs pos="0">
+              <a:schemeClr val="phClr">
+                <a:lumMod val="110000"/>
+                <a:satMod val="105000"/>
+                <a:tint val="67000"/>
+              </a:schemeClr>
+            </a:gs>
+            <a:gs pos="50000">
+              <a:schemeClr val="phClr">
+                <a:lumMod val="105000"/>
+                <a:satMod val="103000"/>
+                <a:tint val="73000"/>
+              </a:schemeClr>
+            </a:gs>
+            <a:gs pos="100000">
+              <a:schemeClr val="phClr">
+                <a:lumMod val="105000"/>
+                <a:satMod val="109000"/>
+                <a:tint val="81000"/>
+              </a:schemeClr>
+            </a:gs>
+          </a:gsLst>
+          <a:lin ang="5400000" scaled="0"/>
+        </a:gradFill>
+        <a:gradFill rotWithShape="1">
+          <a:gsLst>
+            <a:gs pos="0">
+              <a:schemeClr val="phClr">
+                <a:satMod val="103000"/>
+                <a:lumMod val="102000"/>
+                <a:tint val="94000"/>
+              </a:schemeClr>
+            </a:gs>
+            <a:gs pos="50000">
+              <a:schemeClr val="phClr">
+                <a:satMod val="110000"/>
+                <a:lumMod val="100000"/>
+                <a:shade val="100000"/>
+              </a:schemeClr>
+            </a:gs>
+            <a:gs pos="100000">
+              <a:schemeClr val="phClr">
+                <a:lumMod val="99000"/>
+                <a:satMod val="120000"/>
+                <a:shade val="78000"/>
+              </a:schemeClr>
+            </a:gs>
+          </a:gsLst>
+          <a:lin ang="5400000" scaled="0"/>
+        </a:gradFill>
+      </a:fillStyleLst>
+      <a:lnStyleLst>
+        <a:ln w="6350" cap="flat" cmpd="sng" algn="ctr">
+          <a:solidFill>
+            <a:schemeClr val="phClr"/>
+          </a:solidFill>
+          <a:prstDash val="solid"/>
+          <a:miter lim="800000"/>
+        </a:ln>
+        <a:ln w="12700" cap="flat" cmpd="sng" algn="ctr">
+          <a:solidFill>
+            <a:schemeClr val="phClr"/>
+          </a:solidFill>
+          <a:prstDash val="solid"/>
+          <a:miter lim="800000"/>
+        </a:ln>
+        <a:ln w="19050" cap="flat" cmpd="sng" algn="ctr">
+          <a:solidFill>
+            <a:schemeClr val="phClr"/>
+          </a:solidFill>
+          <a:prstDash val="solid"/>
+          <a:miter lim="800000"/>
+        </a:ln>
+      </a:lnStyleLst>
+      <a:effectStyleLst>
+        <a:effectStyle>
+          <a:effectLst/>
+        </a:effectStyle>
+        <a:effectStyle>
+          <a:effectLst/>
+        </a:effectStyle>
+        <a:effectStyle>
+          <a:effectLst>
+            <a:outerShdw blurRad="57150" dist="19050" dir="5400000" algn="ctr" rotWithShape="0">
+              <a:srgbClr val="000000">
+                <a:alpha val="63000"/>
+              </a:srgbClr>
+            </a:outerShdw>
+          </a:effectLst>
+        </a:effectStyle>
+      </a:effectStyleLst>
+      <a:bgFillStyleLst>
+        <a:solidFill>
+          <a:schemeClr val="phClr"/>
+        </a:solidFill>
+        <a:solidFill>
+          <a:schemeClr val="phClr">
+            <a:tint val="95000"/>
+            <a:satMod val="170000"/>
+          </a:schemeClr>
+        </a:solidFill>
+        <a:gradFill rotWithShape="1">
+          <a:gsLst>
+            <a:gs pos="0">
+              <a:schemeClr val="phClr">
+                <a:tint val="93000"/>
+                <a:satMod val="150000"/>
+                <a:shade val="98000"/>
+                <a:lumMod val="102000"/>
+              </a:schemeClr>
+            </a:gs>
+            <a:gs pos="50000">
+              <a:schemeClr val="phClr">
+                <a:tint val="98000"/>
+                <a:satMod val="130000"/>
+                <a:shade val="90000"/>
+                <a:lumMod val="103000"/>
+              </a:schemeClr>
+            </a:gs>
+            <a:gs pos="100000">
+              <a:schemeClr val="phClr">
+                <a:shade val="63000"/>
+                <a:satMod val="120000"/>
+              </a:schemeClr>
+            </a:gs>
+          </a:gsLst>
+          <a:lin ang="5400000" scaled="0"/>
+        </a:gradFill>
+      </a:bgFillStyleLst>
+    </a:fmtScheme>
+  </a:themeElements>
+  <a:objectDefaults/>
+  <a:extraClrSchemeLst/>
+  <a:extLst>
+    <a:ext uri="{05A4C25C-085E-4340-85A3-A5531E510DB2}">
+      <thm15:themeFamily xmlns:thm15="http://schemas.microsoft.com/office/thememl/2012/main" name="Office Theme" id="{62F939B6-93AF-4DB8-9C6B-D6C7DFDC589F}" vid="{4A3C46E8-61CC-4603-A589-7422A47A8E4A}"/>
+    </a:ext>
+  </a:extLst>
+</a:theme>
 </file>
</xml_diff>